<commit_message>
Subida de Evidencias Fase 1
</commit_message>
<xml_diff>
--- a/FASE 1/EVIDENCIAS GRUPALES/Presentación Proyecto.pptx
+++ b/FASE 1/EVIDENCIAS GRUPALES/Presentación Proyecto.pptx
@@ -1371,7 +1371,7 @@
           <a:p>
             <a:fld id="{FBCE52CC-DD0F-44B3-B13D-E7228EEC80E7}" type="slidenum">
               <a:rPr lang="en-US" smtClean="0"/>
-              <a:t>‹#›</a:t>
+              <a:t>‹Nº›</a:t>
             </a:fld>
             <a:endParaRPr lang="en-US"/>
           </a:p>
@@ -1751,7 +1751,7 @@
           <a:p>
             <a:fld id="{893DABDA-89F0-4727-B28F-05A90B0069BB}" type="slidenum">
               <a:rPr lang="zh-CN" altLang="en-US" smtClean="0"/>
-              <a:t>‹#›</a:t>
+              <a:t>‹Nº›</a:t>
             </a:fld>
             <a:endParaRPr lang="zh-CN" altLang="en-US"/>
           </a:p>
@@ -3664,7 +3664,7 @@
           <a:p>
             <a:fld id="{CC057153-B650-4DEB-B370-79DDCFDCE934}" type="slidenum">
               <a:rPr lang="en-US" smtClean="0"/>
-              <a:t>‹#›</a:t>
+              <a:t>‹Nº›</a:t>
             </a:fld>
             <a:endParaRPr lang="en-US"/>
           </a:p>
@@ -4619,7 +4619,7 @@
           <a:p>
             <a:fld id="{CC057153-B650-4DEB-B370-79DDCFDCE934}" type="slidenum">
               <a:rPr lang="en-US" smtClean="0"/>
-              <a:t>‹#›</a:t>
+              <a:t>‹Nº›</a:t>
             </a:fld>
             <a:endParaRPr lang="en-US"/>
           </a:p>
@@ -4986,7 +4986,7 @@
           <a:p>
             <a:fld id="{CC057153-B650-4DEB-B370-79DDCFDCE934}" type="slidenum">
               <a:rPr lang="en-US" smtClean="0"/>
-              <a:t>‹#›</a:t>
+              <a:t>‹Nº›</a:t>
             </a:fld>
             <a:endParaRPr lang="en-US"/>
           </a:p>
@@ -5471,7 +5471,7 @@
           <a:p>
             <a:fld id="{CC057153-B650-4DEB-B370-79DDCFDCE934}" type="slidenum">
               <a:rPr lang="en-US" smtClean="0"/>
-              <a:t>‹#›</a:t>
+              <a:t>‹Nº›</a:t>
             </a:fld>
             <a:endParaRPr lang="en-US"/>
           </a:p>
@@ -5843,7 +5843,7 @@
           <a:p>
             <a:fld id="{CC057153-B650-4DEB-B370-79DDCFDCE934}" type="slidenum">
               <a:rPr lang="en-US" smtClean="0"/>
-              <a:t>‹#›</a:t>
+              <a:t>‹Nº›</a:t>
             </a:fld>
             <a:endParaRPr lang="en-US"/>
           </a:p>
@@ -6102,7 +6102,7 @@
           <a:p>
             <a:fld id="{CC057153-B650-4DEB-B370-79DDCFDCE934}" type="slidenum">
               <a:rPr lang="en-US" smtClean="0"/>
-              <a:t>‹#›</a:t>
+              <a:t>‹Nº›</a:t>
             </a:fld>
             <a:endParaRPr lang="en-US"/>
           </a:p>
@@ -6749,7 +6749,7 @@
           <a:p>
             <a:fld id="{CC057153-B650-4DEB-B370-79DDCFDCE934}" type="slidenum">
               <a:rPr lang="en-US" smtClean="0"/>
-              <a:t>‹#›</a:t>
+              <a:t>‹Nº›</a:t>
             </a:fld>
             <a:endParaRPr lang="en-US"/>
           </a:p>
@@ -7167,7 +7167,7 @@
           <a:p>
             <a:fld id="{CC057153-B650-4DEB-B370-79DDCFDCE934}" type="slidenum">
               <a:rPr lang="en-US" smtClean="0"/>
-              <a:t>‹#›</a:t>
+              <a:t>‹Nº›</a:t>
             </a:fld>
             <a:endParaRPr lang="en-US"/>
           </a:p>
@@ -7815,7 +7815,7 @@
           <a:p>
             <a:fld id="{CC057153-B650-4DEB-B370-79DDCFDCE934}" type="slidenum">
               <a:rPr lang="en-US" smtClean="0"/>
-              <a:t>‹#›</a:t>
+              <a:t>‹Nº›</a:t>
             </a:fld>
             <a:endParaRPr lang="en-US"/>
           </a:p>
@@ -8300,7 +8300,7 @@
           <a:p>
             <a:fld id="{CC057153-B650-4DEB-B370-79DDCFDCE934}" type="slidenum">
               <a:rPr lang="en-US" smtClean="0"/>
-              <a:t>‹#›</a:t>
+              <a:t>‹Nº›</a:t>
             </a:fld>
             <a:endParaRPr lang="en-US"/>
           </a:p>
@@ -8785,7 +8785,7 @@
           <a:p>
             <a:fld id="{CC057153-B650-4DEB-B370-79DDCFDCE934}" type="slidenum">
               <a:rPr lang="en-US" smtClean="0"/>
-              <a:t>‹#›</a:t>
+              <a:t>‹Nº›</a:t>
             </a:fld>
             <a:endParaRPr lang="en-US"/>
           </a:p>
@@ -9199,7 +9199,7 @@
           <a:p>
             <a:fld id="{CC057153-B650-4DEB-B370-79DDCFDCE934}" type="slidenum">
               <a:rPr lang="en-US" smtClean="0"/>
-              <a:t>‹#›</a:t>
+              <a:t>‹Nº›</a:t>
             </a:fld>
             <a:endParaRPr lang="en-US"/>
           </a:p>
@@ -9880,7 +9880,7 @@
             <a:fld id="{CC057153-B650-4DEB-B370-79DDCFDCE934}" type="slidenum">
               <a:rPr lang="en-US" smtClean="0"/>
               <a:pPr/>
-              <a:t>‹#›</a:t>
+              <a:t>‹Nº›</a:t>
             </a:fld>
             <a:endParaRPr lang="en-US"/>
           </a:p>
@@ -10415,7 +10415,7 @@
             <a:fld id="{CC057153-B650-4DEB-B370-79DDCFDCE934}" type="slidenum">
               <a:rPr lang="en-US" smtClean="0"/>
               <a:pPr/>
-              <a:t>‹#›</a:t>
+              <a:t>‹Nº›</a:t>
             </a:fld>
             <a:endParaRPr lang="en-US"/>
           </a:p>
@@ -10950,7 +10950,7 @@
             <a:fld id="{CC057153-B650-4DEB-B370-79DDCFDCE934}" type="slidenum">
               <a:rPr lang="en-US" smtClean="0"/>
               <a:pPr/>
-              <a:t>‹#›</a:t>
+              <a:t>‹Nº›</a:t>
             </a:fld>
             <a:endParaRPr lang="en-US"/>
           </a:p>
@@ -11485,7 +11485,7 @@
             <a:fld id="{CC057153-B650-4DEB-B370-79DDCFDCE934}" type="slidenum">
               <a:rPr lang="en-US" smtClean="0"/>
               <a:pPr/>
-              <a:t>‹#›</a:t>
+              <a:t>‹Nº›</a:t>
             </a:fld>
             <a:endParaRPr lang="en-US"/>
           </a:p>
@@ -11908,7 +11908,7 @@
             <a:fld id="{CC057153-B650-4DEB-B370-79DDCFDCE934}" type="slidenum">
               <a:rPr lang="en-US" smtClean="0"/>
               <a:pPr/>
-              <a:t>‹#›</a:t>
+              <a:t>‹Nº›</a:t>
             </a:fld>
             <a:endParaRPr lang="en-US"/>
           </a:p>
@@ -12443,7 +12443,7 @@
             <a:fld id="{CC057153-B650-4DEB-B370-79DDCFDCE934}" type="slidenum">
               <a:rPr lang="en-US" smtClean="0"/>
               <a:pPr/>
-              <a:t>‹#›</a:t>
+              <a:t>‹Nº›</a:t>
             </a:fld>
             <a:endParaRPr lang="en-US"/>
           </a:p>
@@ -12978,7 +12978,7 @@
             <a:fld id="{CC057153-B650-4DEB-B370-79DDCFDCE934}" type="slidenum">
               <a:rPr lang="en-US" smtClean="0"/>
               <a:pPr/>
-              <a:t>‹#›</a:t>
+              <a:t>‹Nº›</a:t>
             </a:fld>
             <a:endParaRPr lang="en-US"/>
           </a:p>
@@ -13513,7 +13513,7 @@
             <a:fld id="{CC057153-B650-4DEB-B370-79DDCFDCE934}" type="slidenum">
               <a:rPr lang="en-US" smtClean="0"/>
               <a:pPr/>
-              <a:t>‹#›</a:t>
+              <a:t>‹Nº›</a:t>
             </a:fld>
             <a:endParaRPr lang="en-US"/>
           </a:p>
@@ -14003,7 +14003,7 @@
             <a:fld id="{CC057153-B650-4DEB-B370-79DDCFDCE934}" type="slidenum">
               <a:rPr lang="en-US" smtClean="0"/>
               <a:pPr/>
-              <a:t>‹#›</a:t>
+              <a:t>‹Nº›</a:t>
             </a:fld>
             <a:endParaRPr lang="en-US"/>
           </a:p>
@@ -14540,7 +14540,7 @@
             <a:fld id="{CC057153-B650-4DEB-B370-79DDCFDCE934}" type="slidenum">
               <a:rPr lang="en-US" smtClean="0"/>
               <a:pPr/>
-              <a:t>‹#›</a:t>
+              <a:t>‹Nº›</a:t>
             </a:fld>
             <a:endParaRPr lang="en-US"/>
           </a:p>
@@ -14985,7 +14985,7 @@
           <a:p>
             <a:fld id="{CC057153-B650-4DEB-B370-79DDCFDCE934}" type="slidenum">
               <a:rPr lang="en-US" smtClean="0"/>
-              <a:t>‹#›</a:t>
+              <a:t>‹Nº›</a:t>
             </a:fld>
             <a:endParaRPr lang="en-US"/>
           </a:p>
@@ -15637,7 +15637,7 @@
             <a:fld id="{CC057153-B650-4DEB-B370-79DDCFDCE934}" type="slidenum">
               <a:rPr lang="en-US" smtClean="0"/>
               <a:pPr/>
-              <a:t>‹#›</a:t>
+              <a:t>‹Nº›</a:t>
             </a:fld>
             <a:endParaRPr lang="en-US"/>
           </a:p>
@@ -16086,7 +16086,7 @@
           <a:p>
             <a:fld id="{CC057153-B650-4DEB-B370-79DDCFDCE934}" type="slidenum">
               <a:rPr lang="en-US" smtClean="0"/>
-              <a:t>‹#›</a:t>
+              <a:t>‹Nº›</a:t>
             </a:fld>
             <a:endParaRPr lang="en-US"/>
           </a:p>
@@ -16601,7 +16601,7 @@
           <a:p>
             <a:fld id="{CC057153-B650-4DEB-B370-79DDCFDCE934}" type="slidenum">
               <a:rPr lang="en-US" smtClean="0"/>
-              <a:t>‹#›</a:t>
+              <a:t>‹Nº›</a:t>
             </a:fld>
             <a:endParaRPr lang="en-US"/>
           </a:p>
@@ -17317,7 +17317,7 @@
             <a:fld id="{CC057153-B650-4DEB-B370-79DDCFDCE934}" type="slidenum">
               <a:rPr lang="en-US" smtClean="0"/>
               <a:pPr/>
-              <a:t>‹#›</a:t>
+              <a:t>‹Nº›</a:t>
             </a:fld>
             <a:endParaRPr lang="en-US"/>
           </a:p>
@@ -17653,7 +17653,7 @@
           <a:p>
             <a:fld id="{CC057153-B650-4DEB-B370-79DDCFDCE934}" type="slidenum">
               <a:rPr lang="en-US" smtClean="0"/>
-              <a:t>‹#›</a:t>
+              <a:t>‹Nº›</a:t>
             </a:fld>
             <a:endParaRPr lang="en-US"/>
           </a:p>
@@ -18243,7 +18243,7 @@
           <a:p>
             <a:fld id="{CC057153-B650-4DEB-B370-79DDCFDCE934}" type="slidenum">
               <a:rPr lang="en-US" smtClean="0"/>
-              <a:t>‹#›</a:t>
+              <a:t>‹Nº›</a:t>
             </a:fld>
             <a:endParaRPr lang="en-US"/>
           </a:p>
@@ -18767,7 +18767,7 @@
           <a:p>
             <a:fld id="{CC057153-B650-4DEB-B370-79DDCFDCE934}" type="slidenum">
               <a:rPr lang="en-US" smtClean="0"/>
-              <a:t>‹#›</a:t>
+              <a:t>‹Nº›</a:t>
             </a:fld>
             <a:endParaRPr lang="en-US"/>
           </a:p>
@@ -19185,7 +19185,7 @@
           <a:p>
             <a:fld id="{CC057153-B650-4DEB-B370-79DDCFDCE934}" type="slidenum">
               <a:rPr lang="en-US" smtClean="0"/>
-              <a:t>‹#›</a:t>
+              <a:t>‹Nº›</a:t>
             </a:fld>
             <a:endParaRPr lang="en-US"/>
           </a:p>
@@ -19572,7 +19572,7 @@
           <a:p>
             <a:fld id="{CC057153-B650-4DEB-B370-79DDCFDCE934}" type="slidenum">
               <a:rPr lang="en-US" smtClean="0"/>
-              <a:t>‹#›</a:t>
+              <a:t>‹Nº›</a:t>
             </a:fld>
             <a:endParaRPr lang="en-US"/>
           </a:p>
@@ -20017,7 +20017,7 @@
           <a:p>
             <a:fld id="{CC057153-B650-4DEB-B370-79DDCFDCE934}" type="slidenum">
               <a:rPr lang="en-US" smtClean="0"/>
-              <a:t>‹#›</a:t>
+              <a:t>‹Nº›</a:t>
             </a:fld>
             <a:endParaRPr lang="en-US"/>
           </a:p>
@@ -20521,7 +20521,7 @@
           <a:p>
             <a:fld id="{CC057153-B650-4DEB-B370-79DDCFDCE934}" type="slidenum">
               <a:rPr lang="en-US" smtClean="0"/>
-              <a:t>‹#›</a:t>
+              <a:t>‹Nº›</a:t>
             </a:fld>
             <a:endParaRPr lang="en-US"/>
           </a:p>
@@ -21166,7 +21166,7 @@
             <a:fld id="{CC057153-B650-4DEB-B370-79DDCFDCE934}" type="slidenum">
               <a:rPr lang="en-US" smtClean="0"/>
               <a:pPr/>
-              <a:t>‹#›</a:t>
+              <a:t>‹Nº›</a:t>
             </a:fld>
             <a:endParaRPr lang="en-US"/>
           </a:p>
@@ -21553,7 +21553,7 @@
           <a:p>
             <a:fld id="{CC057153-B650-4DEB-B370-79DDCFDCE934}" type="slidenum">
               <a:rPr lang="en-US" smtClean="0"/>
-              <a:t>‹#›</a:t>
+              <a:t>‹Nº›</a:t>
             </a:fld>
             <a:endParaRPr lang="en-US"/>
           </a:p>
@@ -21940,7 +21940,7 @@
           <a:p>
             <a:fld id="{CC057153-B650-4DEB-B370-79DDCFDCE934}" type="slidenum">
               <a:rPr lang="en-US" smtClean="0"/>
-              <a:t>‹#›</a:t>
+              <a:t>‹Nº›</a:t>
             </a:fld>
             <a:endParaRPr lang="en-US"/>
           </a:p>
@@ -22488,7 +22488,7 @@
           <a:p>
             <a:fld id="{CC057153-B650-4DEB-B370-79DDCFDCE934}" type="slidenum">
               <a:rPr lang="en-US" smtClean="0"/>
-              <a:t>‹#›</a:t>
+              <a:t>‹Nº›</a:t>
             </a:fld>
             <a:endParaRPr lang="en-US"/>
           </a:p>
@@ -22944,7 +22944,7 @@
           <a:p>
             <a:fld id="{CC057153-B650-4DEB-B370-79DDCFDCE934}" type="slidenum">
               <a:rPr lang="en-US" smtClean="0"/>
-              <a:t>‹#›</a:t>
+              <a:t>‹Nº›</a:t>
             </a:fld>
             <a:endParaRPr lang="en-US"/>
           </a:p>
@@ -23442,7 +23442,7 @@
           <a:p>
             <a:fld id="{CC057153-B650-4DEB-B370-79DDCFDCE934}" type="slidenum">
               <a:rPr lang="en-US" smtClean="0"/>
-              <a:t>‹#›</a:t>
+              <a:t>‹Nº›</a:t>
             </a:fld>
             <a:endParaRPr lang="en-US"/>
           </a:p>
@@ -23982,7 +23982,7 @@
           <a:p>
             <a:fld id="{CC057153-B650-4DEB-B370-79DDCFDCE934}" type="slidenum">
               <a:rPr lang="en-US" smtClean="0"/>
-              <a:t>‹#›</a:t>
+              <a:t>‹Nº›</a:t>
             </a:fld>
             <a:endParaRPr lang="en-US"/>
           </a:p>
@@ -24679,7 +24679,7 @@
             <a:fld id="{CC057153-B650-4DEB-B370-79DDCFDCE934}" type="slidenum">
               <a:rPr lang="en-US" smtClean="0"/>
               <a:pPr/>
-              <a:t>‹#›</a:t>
+              <a:t>‹Nº›</a:t>
             </a:fld>
             <a:endParaRPr lang="en-US"/>
           </a:p>
@@ -25088,7 +25088,7 @@
             <a:fld id="{CC057153-B650-4DEB-B370-79DDCFDCE934}" type="slidenum">
               <a:rPr lang="en-US" smtClean="0"/>
               <a:pPr/>
-              <a:t>‹#›</a:t>
+              <a:t>‹Nº›</a:t>
             </a:fld>
             <a:endParaRPr lang="en-US"/>
           </a:p>
@@ -26286,7 +26286,7 @@
             <a:fld id="{CC057153-B650-4DEB-B370-79DDCFDCE934}" type="slidenum">
               <a:rPr lang="en-US" smtClean="0"/>
               <a:pPr/>
-              <a:t>‹#›</a:t>
+              <a:t>‹Nº›</a:t>
             </a:fld>
             <a:endParaRPr lang="en-US"/>
           </a:p>
@@ -26698,7 +26698,7 @@
           <a:p>
             <a:fld id="{CC057153-B650-4DEB-B370-79DDCFDCE934}" type="slidenum">
               <a:rPr lang="en-US" smtClean="0"/>
-              <a:t>‹#›</a:t>
+              <a:t>‹Nº›</a:t>
             </a:fld>
             <a:endParaRPr lang="en-US"/>
           </a:p>
@@ -28340,7 +28340,7 @@
             <a:fld id="{CC057153-B650-4DEB-B370-79DDCFDCE934}" type="slidenum">
               <a:rPr lang="en-US" smtClean="0"/>
               <a:pPr/>
-              <a:t>‹#›</a:t>
+              <a:t>‹Nº›</a:t>
             </a:fld>
             <a:endParaRPr lang="en-US"/>
           </a:p>
@@ -29841,7 +29841,7 @@
             <a:fld id="{CC057153-B650-4DEB-B370-79DDCFDCE934}" type="slidenum">
               <a:rPr lang="en-US" smtClean="0"/>
               <a:pPr/>
-              <a:t>‹#›</a:t>
+              <a:t>‹Nº›</a:t>
             </a:fld>
             <a:endParaRPr lang="en-US"/>
           </a:p>
@@ -31535,7 +31535,7 @@
             <a:fld id="{CC057153-B650-4DEB-B370-79DDCFDCE934}" type="slidenum">
               <a:rPr lang="en-US" smtClean="0"/>
               <a:pPr/>
-              <a:t>‹#›</a:t>
+              <a:t>‹Nº›</a:t>
             </a:fld>
             <a:endParaRPr lang="en-US"/>
           </a:p>
@@ -31670,7 +31670,7 @@
           <a:p>
             <a:fld id="{CC057153-B650-4DEB-B370-79DDCFDCE934}" type="slidenum">
               <a:rPr lang="en-US" smtClean="0"/>
-              <a:t>‹#›</a:t>
+              <a:t>‹Nº›</a:t>
             </a:fld>
             <a:endParaRPr lang="en-US"/>
           </a:p>
@@ -32164,7 +32164,7 @@
           <a:p>
             <a:fld id="{CC057153-B650-4DEB-B370-79DDCFDCE934}" type="slidenum">
               <a:rPr lang="en-US" smtClean="0"/>
-              <a:t>‹#›</a:t>
+              <a:t>‹Nº›</a:t>
             </a:fld>
             <a:endParaRPr lang="en-US"/>
           </a:p>
@@ -32743,7 +32743,7 @@
           <a:p>
             <a:fld id="{CC057153-B650-4DEB-B370-79DDCFDCE934}" type="slidenum">
               <a:rPr lang="en-US" smtClean="0"/>
-              <a:t>‹#›</a:t>
+              <a:t>‹Nº›</a:t>
             </a:fld>
             <a:endParaRPr lang="en-US"/>
           </a:p>
@@ -33125,7 +33125,7 @@
           <a:p>
             <a:fld id="{CC057153-B650-4DEB-B370-79DDCFDCE934}" type="slidenum">
               <a:rPr lang="en-US" smtClean="0"/>
-              <a:t>‹#›</a:t>
+              <a:t>‹Nº›</a:t>
             </a:fld>
             <a:endParaRPr lang="en-US"/>
           </a:p>
@@ -33568,7 +33568,7 @@
           <a:p>
             <a:fld id="{CC057153-B650-4DEB-B370-79DDCFDCE934}" type="slidenum">
               <a:rPr lang="en-US" smtClean="0"/>
-              <a:t>‹#›</a:t>
+              <a:t>‹Nº›</a:t>
             </a:fld>
             <a:endParaRPr lang="en-US"/>
           </a:p>
@@ -33967,7 +33967,7 @@
           <a:p>
             <a:fld id="{CC057153-B650-4DEB-B370-79DDCFDCE934}" type="slidenum">
               <a:rPr lang="en-US" smtClean="0"/>
-              <a:t>‹#›</a:t>
+              <a:t>‹Nº›</a:t>
             </a:fld>
             <a:endParaRPr lang="en-US"/>
           </a:p>
@@ -34516,7 +34516,7 @@
           <a:p>
             <a:fld id="{CC057153-B650-4DEB-B370-79DDCFDCE934}" type="slidenum">
               <a:rPr lang="en-US" smtClean="0"/>
-              <a:t>‹#›</a:t>
+              <a:t>‹Nº›</a:t>
             </a:fld>
             <a:endParaRPr lang="en-US"/>
           </a:p>
@@ -34956,7 +34956,7 @@
           <a:p>
             <a:fld id="{CC057153-B650-4DEB-B370-79DDCFDCE934}" type="slidenum">
               <a:rPr lang="en-US" smtClean="0"/>
-              <a:t>‹#›</a:t>
+              <a:t>‹Nº›</a:t>
             </a:fld>
             <a:endParaRPr lang="en-US"/>
           </a:p>
@@ -35444,7 +35444,7 @@
           <a:p>
             <a:fld id="{CC057153-B650-4DEB-B370-79DDCFDCE934}" type="slidenum">
               <a:rPr lang="en-US" smtClean="0"/>
-              <a:t>‹#›</a:t>
+              <a:t>‹Nº›</a:t>
             </a:fld>
             <a:endParaRPr lang="en-US"/>
           </a:p>
@@ -35976,7 +35976,7 @@
           <a:p>
             <a:fld id="{CC057153-B650-4DEB-B370-79DDCFDCE934}" type="slidenum">
               <a:rPr lang="en-US" smtClean="0"/>
-              <a:t>‹#›</a:t>
+              <a:t>‹Nº›</a:t>
             </a:fld>
             <a:endParaRPr lang="en-US"/>
           </a:p>
@@ -36199,7 +36199,7 @@
             <a:fld id="{CC057153-B650-4DEB-B370-79DDCFDCE934}" type="slidenum">
               <a:rPr lang="en-US" smtClean="0"/>
               <a:pPr/>
-              <a:t>‹#›</a:t>
+              <a:t>‹Nº›</a:t>
             </a:fld>
             <a:endParaRPr lang="en-US"/>
           </a:p>
@@ -38184,8 +38184,8 @@
           </a:p>
         </p:txBody>
       </p:sp>
-      <mc:AlternateContent xmlns:mc="http://schemas.openxmlformats.org/markup-compatibility/2006">
-        <mc:Choice xmlns:p14="http://schemas.microsoft.com/office/powerpoint/2010/main" Requires="p14">
+      <mc:AlternateContent xmlns:mc="http://schemas.openxmlformats.org/markup-compatibility/2006" xmlns:p14="http://schemas.microsoft.com/office/powerpoint/2010/main">
+        <mc:Choice Requires="p14">
           <p:contentPart p14:bwMode="auto" r:id="rId3">
             <p14:nvContentPartPr>
               <p14:cNvPr id="9" name="Entrada de lápiz 8">
@@ -38204,7 +38204,7 @@
             </p14:xfrm>
           </p:contentPart>
         </mc:Choice>
-        <mc:Fallback>
+        <mc:Fallback xmlns="">
           <p:pic>
             <p:nvPicPr>
               <p:cNvPr id="9" name="Entrada de lápiz 8">
@@ -38235,8 +38235,8 @@
           </p:pic>
         </mc:Fallback>
       </mc:AlternateContent>
-      <mc:AlternateContent xmlns:mc="http://schemas.openxmlformats.org/markup-compatibility/2006">
-        <mc:Choice xmlns:p14="http://schemas.microsoft.com/office/powerpoint/2010/main" Requires="p14">
+      <mc:AlternateContent xmlns:mc="http://schemas.openxmlformats.org/markup-compatibility/2006" xmlns:p14="http://schemas.microsoft.com/office/powerpoint/2010/main">
+        <mc:Choice Requires="p14">
           <p:contentPart p14:bwMode="auto" r:id="rId5">
             <p14:nvContentPartPr>
               <p14:cNvPr id="10" name="Entrada de lápiz 9">
@@ -38255,7 +38255,7 @@
             </p14:xfrm>
           </p:contentPart>
         </mc:Choice>
-        <mc:Fallback>
+        <mc:Fallback xmlns="">
           <p:pic>
             <p:nvPicPr>
               <p:cNvPr id="10" name="Entrada de lápiz 9">
@@ -38792,8 +38792,8 @@
           </a:p>
         </p:txBody>
       </p:sp>
-      <mc:AlternateContent xmlns:mc="http://schemas.openxmlformats.org/markup-compatibility/2006">
-        <mc:Choice xmlns:p14="http://schemas.microsoft.com/office/powerpoint/2010/main" Requires="p14">
+      <mc:AlternateContent xmlns:mc="http://schemas.openxmlformats.org/markup-compatibility/2006" xmlns:p14="http://schemas.microsoft.com/office/powerpoint/2010/main">
+        <mc:Choice Requires="p14">
           <p:contentPart p14:bwMode="auto" r:id="rId3">
             <p14:nvContentPartPr>
               <p14:cNvPr id="12" name="Entrada de lápiz 11">
@@ -38812,7 +38812,7 @@
             </p14:xfrm>
           </p:contentPart>
         </mc:Choice>
-        <mc:Fallback>
+        <mc:Fallback xmlns="">
           <p:pic>
             <p:nvPicPr>
               <p:cNvPr id="12" name="Entrada de lápiz 11">
@@ -47189,7 +47189,7 @@
       </p:grpSpPr>
       <p:pic>
         <p:nvPicPr>
-          <p:cNvPr id="10" name="Imagen 9" descr="Diagrama, Esquemático&#10;&#10;El contenido generado por IA puede ser incorrecto.">
+          <p:cNvPr id="10" name="Imagen 9">
             <a:extLst>
               <a:ext uri="{FF2B5EF4-FFF2-40B4-BE49-F238E27FC236}">
                 <a16:creationId xmlns:a16="http://schemas.microsoft.com/office/drawing/2014/main" id="{1ECD4ED9-7EF1-5319-9D10-9D0ACDADB333}"/>
@@ -47209,14 +47209,13 @@
               </a:ext>
             </a:extLst>
           </a:blip>
-          <a:stretch>
-            <a:fillRect/>
-          </a:stretch>
+          <a:srcRect/>
+          <a:stretch/>
         </p:blipFill>
         <p:spPr>
           <a:xfrm>
             <a:off x="0" y="0"/>
-            <a:ext cx="8114333" cy="6858000"/>
+            <a:ext cx="8580329" cy="6866912"/>
           </a:xfrm>
           <a:prstGeom prst="rect">
             <a:avLst/>
@@ -48142,6 +48141,19 @@
 </file>
 
 <file path=customXml/item1.xml><?xml version="1.0" encoding="utf-8"?>
+<p:properties xmlns:p="http://schemas.microsoft.com/office/2006/metadata/properties" xmlns:xsi="http://www.w3.org/2001/XMLSchema-instance" xmlns:pc="http://schemas.microsoft.com/office/infopath/2007/PartnerControls">
+  <documentManagement>
+    <_ip_UnifiedCompliancePolicyUIAction xmlns="http://schemas.microsoft.com/sharepoint/v3" xsi:nil="true"/>
+    <TaxCatchAll xmlns="38de0ec0-4312-429b-9ba4-a6f7899b86f2" xsi:nil="true"/>
+    <_ip_UnifiedCompliancePolicyProperties xmlns="http://schemas.microsoft.com/sharepoint/v3" xsi:nil="true"/>
+    <lcf76f155ced4ddcb4097134ff3c332f xmlns="21705155-b4ce-4c69-95dc-4fd6cb8c5571">
+      <Terms xmlns="http://schemas.microsoft.com/office/infopath/2007/PartnerControls"/>
+    </lcf76f155ced4ddcb4097134ff3c332f>
+  </documentManagement>
+</p:properties>
+</file>
+
+<file path=customXml/item2.xml><?xml version="1.0" encoding="utf-8"?>
 <ct:contentTypeSchema xmlns:ct="http://schemas.microsoft.com/office/2006/metadata/contentType" xmlns:ma="http://schemas.microsoft.com/office/2006/metadata/properties/metaAttributes" ct:_="" ma:_="" ma:contentTypeName="Document" ma:contentTypeID="0x0101001867FBBEFD40724CA20725D6B3094130" ma:contentTypeVersion="14" ma:contentTypeDescription="Create a new document." ma:contentTypeScope="" ma:versionID="b563ecc397a77cd5d82b22a852f9d63c">
   <xsd:schema xmlns:xsd="http://www.w3.org/2001/XMLSchema" xmlns:xs="http://www.w3.org/2001/XMLSchema" xmlns:p="http://schemas.microsoft.com/office/2006/metadata/properties" xmlns:ns1="http://schemas.microsoft.com/sharepoint/v3" xmlns:ns2="21705155-b4ce-4c69-95dc-4fd6cb8c5571" xmlns:ns3="38de0ec0-4312-429b-9ba4-a6f7899b86f2" targetNamespace="http://schemas.microsoft.com/office/2006/metadata/properties" ma:root="true" ma:fieldsID="514fef1a96c1431b584933149cb0dc9f" ns1:_="" ns2:_="" ns3:_="">
     <xsd:import namespace="http://schemas.microsoft.com/sharepoint/v3"/>
@@ -48359,19 +48371,6 @@
 </ct:contentTypeSchema>
 </file>
 
-<file path=customXml/item2.xml><?xml version="1.0" encoding="utf-8"?>
-<p:properties xmlns:p="http://schemas.microsoft.com/office/2006/metadata/properties" xmlns:xsi="http://www.w3.org/2001/XMLSchema-instance" xmlns:pc="http://schemas.microsoft.com/office/infopath/2007/PartnerControls">
-  <documentManagement>
-    <_ip_UnifiedCompliancePolicyUIAction xmlns="http://schemas.microsoft.com/sharepoint/v3" xsi:nil="true"/>
-    <TaxCatchAll xmlns="38de0ec0-4312-429b-9ba4-a6f7899b86f2" xsi:nil="true"/>
-    <_ip_UnifiedCompliancePolicyProperties xmlns="http://schemas.microsoft.com/sharepoint/v3" xsi:nil="true"/>
-    <lcf76f155ced4ddcb4097134ff3c332f xmlns="21705155-b4ce-4c69-95dc-4fd6cb8c5571">
-      <Terms xmlns="http://schemas.microsoft.com/office/infopath/2007/PartnerControls"/>
-    </lcf76f155ced4ddcb4097134ff3c332f>
-  </documentManagement>
-</p:properties>
-</file>
-
 <file path=customXml/item3.xml><?xml version="1.0" encoding="utf-8"?>
 <?mso-contentType ?>
 <FormTemplates xmlns="http://schemas.microsoft.com/sharepoint/v3/contenttype/forms">
@@ -48382,6 +48381,18 @@
 </file>
 
 <file path=customXml/itemProps1.xml><?xml version="1.0" encoding="utf-8"?>
+<ds:datastoreItem xmlns:ds="http://schemas.openxmlformats.org/officeDocument/2006/customXml" ds:itemID="{F2AE56A7-C0B1-422F-B93F-A1B9772F5342}">
+  <ds:schemaRefs>
+    <ds:schemaRef ds:uri="21705155-b4ce-4c69-95dc-4fd6cb8c5571"/>
+    <ds:schemaRef ds:uri="38de0ec0-4312-429b-9ba4-a6f7899b86f2"/>
+    <ds:schemaRef ds:uri="http://schemas.microsoft.com/office/2006/metadata/properties"/>
+    <ds:schemaRef ds:uri="http://schemas.microsoft.com/office/infopath/2007/PartnerControls"/>
+    <ds:schemaRef ds:uri="http://schemas.microsoft.com/sharepoint/v3"/>
+  </ds:schemaRefs>
+</ds:datastoreItem>
+</file>
+
+<file path=customXml/itemProps2.xml><?xml version="1.0" encoding="utf-8"?>
 <ds:datastoreItem xmlns:ds="http://schemas.openxmlformats.org/officeDocument/2006/customXml" ds:itemID="{F5C30565-8F81-4B63-A6DA-15D20795E8BB}">
   <ds:schemaRefs>
     <ds:schemaRef ds:uri="21705155-b4ce-4c69-95dc-4fd6cb8c5571"/>
@@ -48401,18 +48412,6 @@
 </ds:datastoreItem>
 </file>
 
-<file path=customXml/itemProps2.xml><?xml version="1.0" encoding="utf-8"?>
-<ds:datastoreItem xmlns:ds="http://schemas.openxmlformats.org/officeDocument/2006/customXml" ds:itemID="{F2AE56A7-C0B1-422F-B93F-A1B9772F5342}">
-  <ds:schemaRefs>
-    <ds:schemaRef ds:uri="21705155-b4ce-4c69-95dc-4fd6cb8c5571"/>
-    <ds:schemaRef ds:uri="38de0ec0-4312-429b-9ba4-a6f7899b86f2"/>
-    <ds:schemaRef ds:uri="http://schemas.microsoft.com/office/2006/metadata/properties"/>
-    <ds:schemaRef ds:uri="http://schemas.microsoft.com/office/infopath/2007/PartnerControls"/>
-    <ds:schemaRef ds:uri="http://schemas.microsoft.com/sharepoint/v3"/>
-  </ds:schemaRefs>
-</ds:datastoreItem>
-</file>
-
 <file path=customXml/itemProps3.xml><?xml version="1.0" encoding="utf-8"?>
 <ds:datastoreItem xmlns:ds="http://schemas.openxmlformats.org/officeDocument/2006/customXml" ds:itemID="{3439F29D-32A6-409A-A026-DEBF052F78D5}">
   <ds:schemaRefs>

</xml_diff>